<commit_message>
THIES - pres linear regression slide
</commit_message>
<xml_diff>
--- a/docs/intermediate-pres.pptx
+++ b/docs/intermediate-pres.pptx
@@ -224,7 +224,7 @@
             <a:fld id="{442DDC49-609A-3B44-A1C6-133788245302}" type="datetime1">
               <a:rPr lang="de-DE" smtClean="0"/>
               <a:pPr/>
-              <a:t>22.06.25</a:t>
+              <a:t>23.06.2025</a:t>
             </a:fld>
             <a:endParaRPr lang="de-DE"/>
           </a:p>
@@ -392,7 +392,7 @@
             <a:fld id="{66C661A5-9AB9-1949-9B9A-C46C190AE8BF}" type="datetime1">
               <a:rPr lang="de-DE" smtClean="0"/>
               <a:pPr/>
-              <a:t>22.06.25</a:t>
+              <a:t>23.06.2025</a:t>
             </a:fld>
             <a:endParaRPr lang="de-DE"/>
           </a:p>
@@ -814,7 +814,7 @@
             <a:fld id="{C5DFC1A0-EAC7-FF46-B484-6832FF4081D7}" type="datetime1">
               <a:rPr lang="de-DE" smtClean="0"/>
               <a:pPr/>
-              <a:t>22.06.25</a:t>
+              <a:t>23.06.2025</a:t>
             </a:fld>
             <a:endParaRPr lang="en-US" dirty="0"/>
           </a:p>
@@ -1244,7 +1244,7 @@
             <a:fld id="{ACF5EF15-2C16-6A49-87B6-C5AFB945A04B}" type="datetime1">
               <a:rPr lang="de-DE" smtClean="0"/>
               <a:pPr/>
-              <a:t>22.06.25</a:t>
+              <a:t>23.06.2025</a:t>
             </a:fld>
             <a:endParaRPr lang="en-US" dirty="0"/>
           </a:p>
@@ -1616,7 +1616,7 @@
             <a:fld id="{ACF5EF15-2C16-6A49-87B6-C5AFB945A04B}" type="datetime1">
               <a:rPr lang="de-DE" smtClean="0"/>
               <a:pPr/>
-              <a:t>22.06.25</a:t>
+              <a:t>23.06.2025</a:t>
             </a:fld>
             <a:endParaRPr lang="en-US" dirty="0"/>
           </a:p>
@@ -1833,7 +1833,7 @@
             <a:fld id="{ACF5EF15-2C16-6A49-87B6-C5AFB945A04B}" type="datetime1">
               <a:rPr lang="de-DE" smtClean="0"/>
               <a:pPr/>
-              <a:t>22.06.25</a:t>
+              <a:t>23.06.2025</a:t>
             </a:fld>
             <a:endParaRPr lang="en-US" dirty="0"/>
           </a:p>
@@ -2017,7 +2017,7 @@
             <a:fld id="{C8A51442-76F6-0047-9EC6-9C35C6FEA6B1}" type="datetime1">
               <a:rPr lang="de-DE" smtClean="0"/>
               <a:pPr/>
-              <a:t>22.06.25</a:t>
+              <a:t>23.06.2025</a:t>
             </a:fld>
             <a:endParaRPr lang="en-US" dirty="0"/>
           </a:p>
@@ -2588,7 +2588,7 @@
             <a:fld id="{ACF5EF15-2C16-6A49-87B6-C5AFB945A04B}" type="datetime1">
               <a:rPr lang="de-DE" smtClean="0"/>
               <a:pPr/>
-              <a:t>22.06.25</a:t>
+              <a:t>23.06.2025</a:t>
             </a:fld>
             <a:endParaRPr lang="en-US" dirty="0"/>
           </a:p>
@@ -2879,7 +2879,7 @@
             <a:fld id="{ACF5EF15-2C16-6A49-87B6-C5AFB945A04B}" type="datetime1">
               <a:rPr lang="de-DE" smtClean="0"/>
               <a:pPr/>
-              <a:t>22.06.25</a:t>
+              <a:t>23.06.2025</a:t>
             </a:fld>
             <a:endParaRPr lang="en-US" dirty="0"/>
           </a:p>
@@ -3178,7 +3178,7 @@
             <a:fld id="{ACF5EF15-2C16-6A49-87B6-C5AFB945A04B}" type="datetime1">
               <a:rPr lang="de-DE" smtClean="0"/>
               <a:pPr/>
-              <a:t>22.06.25</a:t>
+              <a:t>23.06.2025</a:t>
             </a:fld>
             <a:endParaRPr lang="en-US" dirty="0"/>
           </a:p>
@@ -3375,7 +3375,7 @@
                 <a:cs typeface="Times New Roman" panose="02020603050405020304" pitchFamily="18" charset="0"/>
               </a:rPr>
               <a:pPr/>
-              <a:t>22.06.25</a:t>
+              <a:t>23.06.2025</a:t>
             </a:fld>
             <a:endParaRPr lang="en-US" dirty="0">
               <a:latin typeface="Times New Roman" panose="02020603050405020304" pitchFamily="18" charset="0"/>
@@ -4503,7 +4503,7 @@
             <a:fld id="{ACF5EF15-2C16-6A49-87B6-C5AFB945A04B}" type="datetime1">
               <a:rPr lang="de-DE" smtClean="0"/>
               <a:pPr/>
-              <a:t>22.06.25</a:t>
+              <a:t>23.06.2025</a:t>
             </a:fld>
             <a:endParaRPr lang="en-US" dirty="0"/>
           </a:p>
@@ -4846,7 +4846,7 @@
             <a:fld id="{ACF5EF15-2C16-6A49-87B6-C5AFB945A04B}" type="datetime1">
               <a:rPr lang="de-DE" smtClean="0"/>
               <a:pPr/>
-              <a:t>22.06.25</a:t>
+              <a:t>23.06.2025</a:t>
             </a:fld>
             <a:endParaRPr lang="en-US" dirty="0"/>
           </a:p>
@@ -5134,7 +5134,7 @@
             <a:fld id="{ACF5EF15-2C16-6A49-87B6-C5AFB945A04B}" type="datetime1">
               <a:rPr lang="de-DE" smtClean="0"/>
               <a:pPr/>
-              <a:t>22.06.25</a:t>
+              <a:t>23.06.2025</a:t>
             </a:fld>
             <a:endParaRPr lang="en-US" dirty="0"/>
           </a:p>
@@ -5352,7 +5352,7 @@
             <a:fld id="{ACF5EF15-2C16-6A49-87B6-C5AFB945A04B}" type="datetime1">
               <a:rPr lang="de-DE" smtClean="0"/>
               <a:pPr/>
-              <a:t>22.06.25</a:t>
+              <a:t>23.06.2025</a:t>
             </a:fld>
             <a:endParaRPr lang="en-US" dirty="0"/>
           </a:p>
@@ -5743,7 +5743,7 @@
             <a:fld id="{ACF5EF15-2C16-6A49-87B6-C5AFB945A04B}" type="datetime1">
               <a:rPr lang="de-DE" smtClean="0"/>
               <a:pPr/>
-              <a:t>22.06.25</a:t>
+              <a:t>23.06.2025</a:t>
             </a:fld>
             <a:endParaRPr lang="en-US" dirty="0"/>
           </a:p>
@@ -6352,7 +6352,7 @@
             <a:fld id="{ACF5EF15-2C16-6A49-87B6-C5AFB945A04B}" type="datetime1">
               <a:rPr lang="de-DE" smtClean="0"/>
               <a:pPr/>
-              <a:t>22.06.25</a:t>
+              <a:t>23.06.2025</a:t>
             </a:fld>
             <a:endParaRPr lang="en-US" dirty="0"/>
           </a:p>
@@ -7007,7 +7007,7 @@
             <a:fld id="{ACF5EF15-2C16-6A49-87B6-C5AFB945A04B}" type="datetime1">
               <a:rPr lang="de-DE" smtClean="0"/>
               <a:pPr/>
-              <a:t>22.06.25</a:t>
+              <a:t>23.06.2025</a:t>
             </a:fld>
             <a:endParaRPr lang="en-US" dirty="0"/>
           </a:p>
@@ -7188,7 +7188,22 @@
                 <a:latin typeface="Times New Roman" panose="02020603050405020304" pitchFamily="18" charset="0"/>
                 <a:cs typeface="Times New Roman" panose="02020603050405020304" pitchFamily="18" charset="0"/>
               </a:rPr>
-              <a:t>TODO</a:t>
+              <a:t>Using scikit-learn </a:t>
+            </a:r>
+            <a:r>
+              <a:rPr lang="en-US" i="1" dirty="0">
+                <a:latin typeface="Times New Roman" panose="02020603050405020304" pitchFamily="18" charset="0"/>
+                <a:cs typeface="Times New Roman" panose="02020603050405020304" pitchFamily="18" charset="0"/>
+                <a:hlinkClick r:id="rId2"/>
+              </a:rPr>
+              <a:t>https://scikit-learn.org/stable/modules/generated/sklearn.linear_model.LinearRegression.html</a:t>
+            </a:r>
+            <a:r>
+              <a:rPr lang="en-US" i="1" dirty="0">
+                <a:latin typeface="Times New Roman" panose="02020603050405020304" pitchFamily="18" charset="0"/>
+                <a:cs typeface="Times New Roman" panose="02020603050405020304" pitchFamily="18" charset="0"/>
+              </a:rPr>
+              <a:t> </a:t>
             </a:r>
           </a:p>
         </p:txBody>
@@ -7246,7 +7261,7 @@
             <a:fld id="{ACF5EF15-2C16-6A49-87B6-C5AFB945A04B}" type="datetime1">
               <a:rPr lang="de-DE" smtClean="0"/>
               <a:pPr/>
-              <a:t>22.06.25</a:t>
+              <a:t>23.06.2025</a:t>
             </a:fld>
             <a:endParaRPr lang="en-US" dirty="0"/>
           </a:p>
@@ -7307,6 +7322,53 @@
           </a:p>
         </p:txBody>
       </p:sp>
+      <p:pic>
+        <p:nvPicPr>
+          <p:cNvPr id="1026" name="Picture 2">
+            <a:extLst>
+              <a:ext uri="{FF2B5EF4-FFF2-40B4-BE49-F238E27FC236}">
+                <a16:creationId xmlns:a16="http://schemas.microsoft.com/office/drawing/2014/main" id="{205B5544-B289-DAEC-091E-C44BD4D543F4}"/>
+              </a:ext>
+            </a:extLst>
+          </p:cNvPr>
+          <p:cNvPicPr>
+            <a:picLocks noChangeAspect="1" noChangeArrowheads="1"/>
+          </p:cNvPicPr>
+          <p:nvPr/>
+        </p:nvPicPr>
+        <p:blipFill rotWithShape="1">
+          <a:blip r:embed="rId3">
+            <a:extLst>
+              <a:ext uri="{28A0092B-C50C-407E-A947-70E740481C1C}">
+                <a14:useLocalDpi xmlns:a14="http://schemas.microsoft.com/office/drawing/2010/main" val="0"/>
+              </a:ext>
+            </a:extLst>
+          </a:blip>
+          <a:srcRect l="22484" t="29027" r="22376" b="31736"/>
+          <a:stretch>
+            <a:fillRect/>
+          </a:stretch>
+        </p:blipFill>
+        <p:spPr bwMode="auto">
+          <a:xfrm>
+            <a:off x="4700156" y="1491630"/>
+            <a:ext cx="2529755" cy="1800200"/>
+          </a:xfrm>
+          <a:prstGeom prst="rect">
+            <a:avLst/>
+          </a:prstGeom>
+          <a:noFill/>
+          <a:extLst>
+            <a:ext uri="{909E8E84-426E-40DD-AFC4-6F175D3DCCD1}">
+              <a14:hiddenFill xmlns:a14="http://schemas.microsoft.com/office/drawing/2010/main">
+                <a:solidFill>
+                  <a:srgbClr val="FFFFFF"/>
+                </a:solidFill>
+              </a14:hiddenFill>
+            </a:ext>
+          </a:extLst>
+        </p:spPr>
+      </p:pic>
     </p:spTree>
     <p:extLst>
       <p:ext uri="{BB962C8B-B14F-4D97-AF65-F5344CB8AC3E}">

</xml_diff>

<commit_message>
LENNART - adds slide for further cleaning steps
</commit_message>
<xml_diff>
--- a/docs/intermediate-pres.pptx
+++ b/docs/intermediate-pres.pptx
@@ -5,25 +5,26 @@
     <p:sldMasterId id="2147483648" r:id="rId1"/>
   </p:sldMasterIdLst>
   <p:notesMasterIdLst>
-    <p:notesMasterId r:id="rId15"/>
+    <p:notesMasterId r:id="rId16"/>
   </p:notesMasterIdLst>
   <p:handoutMasterIdLst>
-    <p:handoutMasterId r:id="rId16"/>
+    <p:handoutMasterId r:id="rId17"/>
   </p:handoutMasterIdLst>
   <p:sldIdLst>
     <p:sldId id="258" r:id="rId2"/>
     <p:sldId id="259" r:id="rId3"/>
     <p:sldId id="260" r:id="rId4"/>
     <p:sldId id="262" r:id="rId5"/>
-    <p:sldId id="261" r:id="rId6"/>
-    <p:sldId id="264" r:id="rId7"/>
-    <p:sldId id="265" r:id="rId8"/>
-    <p:sldId id="263" r:id="rId9"/>
-    <p:sldId id="268" r:id="rId10"/>
-    <p:sldId id="269" r:id="rId11"/>
-    <p:sldId id="267" r:id="rId12"/>
-    <p:sldId id="270" r:id="rId13"/>
-    <p:sldId id="266" r:id="rId14"/>
+    <p:sldId id="271" r:id="rId6"/>
+    <p:sldId id="261" r:id="rId7"/>
+    <p:sldId id="264" r:id="rId8"/>
+    <p:sldId id="265" r:id="rId9"/>
+    <p:sldId id="263" r:id="rId10"/>
+    <p:sldId id="268" r:id="rId11"/>
+    <p:sldId id="269" r:id="rId12"/>
+    <p:sldId id="267" r:id="rId13"/>
+    <p:sldId id="270" r:id="rId14"/>
+    <p:sldId id="266" r:id="rId15"/>
   </p:sldIdLst>
   <p:sldSz cx="9144000" cy="5143500" type="screen16x9"/>
   <p:notesSz cx="13004800" cy="9753600"/>
@@ -224,7 +225,7 @@
             <a:fld id="{442DDC49-609A-3B44-A1C6-133788245302}" type="datetime1">
               <a:rPr lang="de-DE" smtClean="0"/>
               <a:pPr/>
-              <a:t>23.06.2025</a:t>
+              <a:t>24.06.25</a:t>
             </a:fld>
             <a:endParaRPr lang="de-DE"/>
           </a:p>
@@ -392,7 +393,7 @@
             <a:fld id="{66C661A5-9AB9-1949-9B9A-C46C190AE8BF}" type="datetime1">
               <a:rPr lang="de-DE" smtClean="0"/>
               <a:pPr/>
-              <a:t>23.06.2025</a:t>
+              <a:t>24.06.25</a:t>
             </a:fld>
             <a:endParaRPr lang="de-DE"/>
           </a:p>
@@ -814,7 +815,7 @@
             <a:fld id="{C5DFC1A0-EAC7-FF46-B484-6832FF4081D7}" type="datetime1">
               <a:rPr lang="de-DE" smtClean="0"/>
               <a:pPr/>
-              <a:t>23.06.2025</a:t>
+              <a:t>24.06.25</a:t>
             </a:fld>
             <a:endParaRPr lang="en-US" dirty="0"/>
           </a:p>
@@ -1244,7 +1245,7 @@
             <a:fld id="{ACF5EF15-2C16-6A49-87B6-C5AFB945A04B}" type="datetime1">
               <a:rPr lang="de-DE" smtClean="0"/>
               <a:pPr/>
-              <a:t>23.06.2025</a:t>
+              <a:t>24.06.25</a:t>
             </a:fld>
             <a:endParaRPr lang="en-US" dirty="0"/>
           </a:p>
@@ -1616,7 +1617,7 @@
             <a:fld id="{ACF5EF15-2C16-6A49-87B6-C5AFB945A04B}" type="datetime1">
               <a:rPr lang="de-DE" smtClean="0"/>
               <a:pPr/>
-              <a:t>23.06.2025</a:t>
+              <a:t>24.06.25</a:t>
             </a:fld>
             <a:endParaRPr lang="en-US" dirty="0"/>
           </a:p>
@@ -1833,7 +1834,7 @@
             <a:fld id="{ACF5EF15-2C16-6A49-87B6-C5AFB945A04B}" type="datetime1">
               <a:rPr lang="de-DE" smtClean="0"/>
               <a:pPr/>
-              <a:t>23.06.2025</a:t>
+              <a:t>24.06.25</a:t>
             </a:fld>
             <a:endParaRPr lang="en-US" dirty="0"/>
           </a:p>
@@ -2017,7 +2018,7 @@
             <a:fld id="{C8A51442-76F6-0047-9EC6-9C35C6FEA6B1}" type="datetime1">
               <a:rPr lang="de-DE" smtClean="0"/>
               <a:pPr/>
-              <a:t>23.06.2025</a:t>
+              <a:t>24.06.25</a:t>
             </a:fld>
             <a:endParaRPr lang="en-US" dirty="0"/>
           </a:p>
@@ -2431,6 +2432,307 @@
         <p:cNvPr id="1" name="">
           <a:extLst>
             <a:ext uri="{FF2B5EF4-FFF2-40B4-BE49-F238E27FC236}">
+              <a16:creationId xmlns:a16="http://schemas.microsoft.com/office/drawing/2014/main" id="{4AA49870-27B0-7685-862B-3AEB5695355D}"/>
+            </a:ext>
+          </a:extLst>
+        </p:cNvPr>
+        <p:cNvGrpSpPr/>
+        <p:nvPr/>
+      </p:nvGrpSpPr>
+      <p:grpSpPr>
+        <a:xfrm>
+          <a:off x="0" y="0"/>
+          <a:ext cx="0" cy="0"/>
+          <a:chOff x="0" y="0"/>
+          <a:chExt cx="0" cy="0"/>
+        </a:xfrm>
+      </p:grpSpPr>
+      <p:sp>
+        <p:nvSpPr>
+          <p:cNvPr id="2" name="Title 1">
+            <a:extLst>
+              <a:ext uri="{FF2B5EF4-FFF2-40B4-BE49-F238E27FC236}">
+                <a16:creationId xmlns:a16="http://schemas.microsoft.com/office/drawing/2014/main" id="{66449D65-759A-962E-F4F3-DDF87E12A0DE}"/>
+              </a:ext>
+            </a:extLst>
+          </p:cNvPr>
+          <p:cNvSpPr>
+            <a:spLocks noGrp="1"/>
+          </p:cNvSpPr>
+          <p:nvPr>
+            <p:ph type="title"/>
+          </p:nvPr>
+        </p:nvSpPr>
+        <p:spPr/>
+        <p:txBody>
+          <a:bodyPr/>
+          <a:lstStyle/>
+          <a:p>
+            <a:r>
+              <a:rPr lang="en-US" b="1" dirty="0">
+                <a:latin typeface="Times New Roman" panose="02020603050405020304" pitchFamily="18" charset="0"/>
+                <a:cs typeface="Times New Roman" panose="02020603050405020304" pitchFamily="18" charset="0"/>
+              </a:rPr>
+              <a:t>Different Models </a:t>
+            </a:r>
+            <a:r>
+              <a:rPr lang="en-US" dirty="0">
+                <a:latin typeface="Times New Roman" panose="02020603050405020304" pitchFamily="18" charset="0"/>
+                <a:cs typeface="Times New Roman" panose="02020603050405020304" pitchFamily="18" charset="0"/>
+              </a:rPr>
+              <a:t>–</a:t>
+            </a:r>
+            <a:r>
+              <a:rPr lang="en-US" sz="2400" dirty="0">
+                <a:latin typeface="Times New Roman" panose="02020603050405020304" pitchFamily="18" charset="0"/>
+                <a:cs typeface="Times New Roman" panose="02020603050405020304" pitchFamily="18" charset="0"/>
+              </a:rPr>
+              <a:t> Linear or Polynomial Regression</a:t>
+            </a:r>
+            <a:endParaRPr lang="en-US" dirty="0">
+              <a:latin typeface="Times New Roman" panose="02020603050405020304" pitchFamily="18" charset="0"/>
+              <a:cs typeface="Times New Roman" panose="02020603050405020304" pitchFamily="18" charset="0"/>
+            </a:endParaRPr>
+          </a:p>
+        </p:txBody>
+      </p:sp>
+      <p:sp>
+        <p:nvSpPr>
+          <p:cNvPr id="3" name="Text Placeholder 2">
+            <a:extLst>
+              <a:ext uri="{FF2B5EF4-FFF2-40B4-BE49-F238E27FC236}">
+                <a16:creationId xmlns:a16="http://schemas.microsoft.com/office/drawing/2014/main" id="{5FE36AFA-D0E4-5A70-1353-C70E56DFD640}"/>
+              </a:ext>
+            </a:extLst>
+          </p:cNvPr>
+          <p:cNvSpPr>
+            <a:spLocks noGrp="1"/>
+          </p:cNvSpPr>
+          <p:nvPr>
+            <p:ph type="body" idx="1"/>
+          </p:nvPr>
+        </p:nvSpPr>
+        <p:spPr>
+          <a:xfrm>
+            <a:off x="660800" y="1563638"/>
+            <a:ext cx="3335137" cy="2808312"/>
+          </a:xfrm>
+        </p:spPr>
+        <p:txBody>
+          <a:bodyPr/>
+          <a:lstStyle/>
+          <a:p>
+            <a:pPr marL="342900" indent="-342900">
+              <a:buFont typeface="Wingdings" pitchFamily="2" charset="2"/>
+              <a:buChar char="Ø"/>
+            </a:pPr>
+            <a:r>
+              <a:rPr lang="en-US" i="1" dirty="0">
+                <a:latin typeface="Times New Roman" panose="02020603050405020304" pitchFamily="18" charset="0"/>
+                <a:cs typeface="Times New Roman" panose="02020603050405020304" pitchFamily="18" charset="0"/>
+              </a:rPr>
+              <a:t>Using scikit-learn </a:t>
+            </a:r>
+            <a:r>
+              <a:rPr lang="en-US" i="1" dirty="0">
+                <a:latin typeface="Times New Roman" panose="02020603050405020304" pitchFamily="18" charset="0"/>
+                <a:cs typeface="Times New Roman" panose="02020603050405020304" pitchFamily="18" charset="0"/>
+                <a:hlinkClick r:id="rId2"/>
+              </a:rPr>
+              <a:t>https://scikit-learn.org/stable/modules/generated/sklearn.linear_model.LinearRegression.html</a:t>
+            </a:r>
+            <a:r>
+              <a:rPr lang="en-US" i="1" dirty="0">
+                <a:latin typeface="Times New Roman" panose="02020603050405020304" pitchFamily="18" charset="0"/>
+                <a:cs typeface="Times New Roman" panose="02020603050405020304" pitchFamily="18" charset="0"/>
+              </a:rPr>
+              <a:t> </a:t>
+            </a:r>
+          </a:p>
+        </p:txBody>
+      </p:sp>
+      <p:sp>
+        <p:nvSpPr>
+          <p:cNvPr id="4" name="Footer Placeholder 3">
+            <a:extLst>
+              <a:ext uri="{FF2B5EF4-FFF2-40B4-BE49-F238E27FC236}">
+                <a16:creationId xmlns:a16="http://schemas.microsoft.com/office/drawing/2014/main" id="{B441B04E-B54D-CA82-FA87-EF5BC37F6787}"/>
+              </a:ext>
+            </a:extLst>
+          </p:cNvPr>
+          <p:cNvSpPr>
+            <a:spLocks noGrp="1"/>
+          </p:cNvSpPr>
+          <p:nvPr>
+            <p:ph type="ftr" sz="quarter" idx="3"/>
+          </p:nvPr>
+        </p:nvSpPr>
+        <p:spPr/>
+        <p:txBody>
+          <a:bodyPr/>
+          <a:lstStyle/>
+          <a:p>
+            <a:r>
+              <a:rPr lang="de-DE"/>
+              <a:t>Georg-August-Universität Göttingen</a:t>
+            </a:r>
+            <a:endParaRPr lang="de-DE" dirty="0"/>
+          </a:p>
+        </p:txBody>
+      </p:sp>
+      <p:sp>
+        <p:nvSpPr>
+          <p:cNvPr id="5" name="Date Placeholder 4">
+            <a:extLst>
+              <a:ext uri="{FF2B5EF4-FFF2-40B4-BE49-F238E27FC236}">
+                <a16:creationId xmlns:a16="http://schemas.microsoft.com/office/drawing/2014/main" id="{C615A5CF-9BD7-1252-BB15-AEEFA9100735}"/>
+              </a:ext>
+            </a:extLst>
+          </p:cNvPr>
+          <p:cNvSpPr>
+            <a:spLocks noGrp="1"/>
+          </p:cNvSpPr>
+          <p:nvPr>
+            <p:ph type="dt" sz="half" idx="2"/>
+          </p:nvPr>
+        </p:nvSpPr>
+        <p:spPr/>
+        <p:txBody>
+          <a:bodyPr/>
+          <a:lstStyle/>
+          <a:p>
+            <a:fld id="{ACF5EF15-2C16-6A49-87B6-C5AFB945A04B}" type="datetime1">
+              <a:rPr lang="de-DE" smtClean="0"/>
+              <a:pPr/>
+              <a:t>24.06.25</a:t>
+            </a:fld>
+            <a:endParaRPr lang="en-US" dirty="0"/>
+          </a:p>
+        </p:txBody>
+      </p:sp>
+      <p:sp>
+        <p:nvSpPr>
+          <p:cNvPr id="6" name="Slide Number Placeholder 5">
+            <a:extLst>
+              <a:ext uri="{FF2B5EF4-FFF2-40B4-BE49-F238E27FC236}">
+                <a16:creationId xmlns:a16="http://schemas.microsoft.com/office/drawing/2014/main" id="{87A3A427-7A1A-6DC6-5F8B-989045EA002D}"/>
+              </a:ext>
+            </a:extLst>
+          </p:cNvPr>
+          <p:cNvSpPr>
+            <a:spLocks noGrp="1"/>
+          </p:cNvSpPr>
+          <p:nvPr>
+            <p:ph type="sldNum" sz="quarter" idx="4"/>
+          </p:nvPr>
+        </p:nvSpPr>
+        <p:spPr/>
+        <p:txBody>
+          <a:bodyPr/>
+          <a:lstStyle/>
+          <a:p>
+            <a:fld id="{B6F15528-21DE-4FAA-801E-634DDDAF4B2B}" type="slidenum">
+              <a:rPr lang="de-DE" smtClean="0"/>
+              <a:pPr/>
+              <a:t>10</a:t>
+            </a:fld>
+            <a:endParaRPr lang="de-DE" dirty="0"/>
+          </a:p>
+        </p:txBody>
+      </p:sp>
+      <p:sp>
+        <p:nvSpPr>
+          <p:cNvPr id="7" name="Text Placeholder 6">
+            <a:extLst>
+              <a:ext uri="{FF2B5EF4-FFF2-40B4-BE49-F238E27FC236}">
+                <a16:creationId xmlns:a16="http://schemas.microsoft.com/office/drawing/2014/main" id="{52581F9D-4FEA-92EB-40CF-9EDB007EF78D}"/>
+              </a:ext>
+            </a:extLst>
+          </p:cNvPr>
+          <p:cNvSpPr>
+            <a:spLocks noGrp="1"/>
+          </p:cNvSpPr>
+          <p:nvPr>
+            <p:ph type="body" sz="quarter" idx="12"/>
+          </p:nvPr>
+        </p:nvSpPr>
+        <p:spPr/>
+        <p:txBody>
+          <a:bodyPr/>
+          <a:lstStyle/>
+          <a:p>
+            <a:endParaRPr lang="en-US"/>
+          </a:p>
+        </p:txBody>
+      </p:sp>
+      <p:pic>
+        <p:nvPicPr>
+          <p:cNvPr id="1026" name="Picture 2">
+            <a:extLst>
+              <a:ext uri="{FF2B5EF4-FFF2-40B4-BE49-F238E27FC236}">
+                <a16:creationId xmlns:a16="http://schemas.microsoft.com/office/drawing/2014/main" id="{205B5544-B289-DAEC-091E-C44BD4D543F4}"/>
+              </a:ext>
+            </a:extLst>
+          </p:cNvPr>
+          <p:cNvPicPr>
+            <a:picLocks noChangeAspect="1" noChangeArrowheads="1"/>
+          </p:cNvPicPr>
+          <p:nvPr/>
+        </p:nvPicPr>
+        <p:blipFill rotWithShape="1">
+          <a:blip r:embed="rId3">
+            <a:extLst>
+              <a:ext uri="{28A0092B-C50C-407E-A947-70E740481C1C}">
+                <a14:useLocalDpi xmlns:a14="http://schemas.microsoft.com/office/drawing/2010/main" val="0"/>
+              </a:ext>
+            </a:extLst>
+          </a:blip>
+          <a:srcRect l="22484" t="29027" r="22376" b="31736"/>
+          <a:stretch>
+            <a:fillRect/>
+          </a:stretch>
+        </p:blipFill>
+        <p:spPr bwMode="auto">
+          <a:xfrm>
+            <a:off x="4700156" y="1491630"/>
+            <a:ext cx="2529755" cy="1800200"/>
+          </a:xfrm>
+          <a:prstGeom prst="rect">
+            <a:avLst/>
+          </a:prstGeom>
+          <a:noFill/>
+          <a:extLst>
+            <a:ext uri="{909E8E84-426E-40DD-AFC4-6F175D3DCCD1}">
+              <a14:hiddenFill xmlns:a14="http://schemas.microsoft.com/office/drawing/2010/main">
+                <a:solidFill>
+                  <a:srgbClr val="FFFFFF"/>
+                </a:solidFill>
+              </a14:hiddenFill>
+            </a:ext>
+          </a:extLst>
+        </p:spPr>
+      </p:pic>
+    </p:spTree>
+    <p:extLst>
+      <p:ext uri="{BB962C8B-B14F-4D97-AF65-F5344CB8AC3E}">
+        <p14:creationId xmlns:p14="http://schemas.microsoft.com/office/powerpoint/2010/main" val="4170914606"/>
+      </p:ext>
+    </p:extLst>
+  </p:cSld>
+  <p:clrMapOvr>
+    <a:masterClrMapping/>
+  </p:clrMapOvr>
+</p:sld>
+</file>
+
+<file path=ppt/slides/slide11.xml><?xml version="1.0" encoding="utf-8"?>
+<p:sld xmlns:a="http://schemas.openxmlformats.org/drawingml/2006/main" xmlns:r="http://schemas.openxmlformats.org/officeDocument/2006/relationships" xmlns:p="http://schemas.openxmlformats.org/presentationml/2006/main">
+  <p:cSld>
+    <p:spTree>
+      <p:nvGrpSpPr>
+        <p:cNvPr id="1" name="">
+          <a:extLst>
+            <a:ext uri="{FF2B5EF4-FFF2-40B4-BE49-F238E27FC236}">
               <a16:creationId xmlns:a16="http://schemas.microsoft.com/office/drawing/2014/main" id="{550B74DD-4E15-D82F-3A86-2887C760C174}"/>
             </a:ext>
           </a:extLst>
@@ -2588,7 +2890,7 @@
             <a:fld id="{ACF5EF15-2C16-6A49-87B6-C5AFB945A04B}" type="datetime1">
               <a:rPr lang="de-DE" smtClean="0"/>
               <a:pPr/>
-              <a:t>23.06.2025</a:t>
+              <a:t>24.06.25</a:t>
             </a:fld>
             <a:endParaRPr lang="en-US" dirty="0"/>
           </a:p>
@@ -2618,7 +2920,7 @@
             <a:fld id="{B6F15528-21DE-4FAA-801E-634DDDAF4B2B}" type="slidenum">
               <a:rPr lang="de-DE" smtClean="0"/>
               <a:pPr/>
-              <a:t>10</a:t>
+              <a:t>11</a:t>
             </a:fld>
             <a:endParaRPr lang="de-DE" dirty="0"/>
           </a:p>
@@ -2662,7 +2964,7 @@
 </p:sld>
 </file>
 
-<file path=ppt/slides/slide11.xml><?xml version="1.0" encoding="utf-8"?>
+<file path=ppt/slides/slide12.xml><?xml version="1.0" encoding="utf-8"?>
 <p:sld xmlns:a="http://schemas.openxmlformats.org/drawingml/2006/main" xmlns:r="http://schemas.openxmlformats.org/officeDocument/2006/relationships" xmlns:p="http://schemas.openxmlformats.org/presentationml/2006/main">
   <p:cSld>
     <p:spTree>
@@ -2879,7 +3181,7 @@
             <a:fld id="{ACF5EF15-2C16-6A49-87B6-C5AFB945A04B}" type="datetime1">
               <a:rPr lang="de-DE" smtClean="0"/>
               <a:pPr/>
-              <a:t>23.06.2025</a:t>
+              <a:t>24.06.25</a:t>
             </a:fld>
             <a:endParaRPr lang="en-US" dirty="0"/>
           </a:p>
@@ -2909,7 +3211,7 @@
             <a:fld id="{B6F15528-21DE-4FAA-801E-634DDDAF4B2B}" type="slidenum">
               <a:rPr lang="de-DE" smtClean="0"/>
               <a:pPr/>
-              <a:t>11</a:t>
+              <a:t>12</a:t>
             </a:fld>
             <a:endParaRPr lang="de-DE" dirty="0"/>
           </a:p>
@@ -3013,7 +3315,7 @@
 </p:sld>
 </file>
 
-<file path=ppt/slides/slide12.xml><?xml version="1.0" encoding="utf-8"?>
+<file path=ppt/slides/slide13.xml><?xml version="1.0" encoding="utf-8"?>
 <p:sld xmlns:a="http://schemas.openxmlformats.org/drawingml/2006/main" xmlns:r="http://schemas.openxmlformats.org/officeDocument/2006/relationships" xmlns:p="http://schemas.openxmlformats.org/presentationml/2006/main">
   <p:cSld>
     <p:spTree>
@@ -3178,7 +3480,7 @@
             <a:fld id="{ACF5EF15-2C16-6A49-87B6-C5AFB945A04B}" type="datetime1">
               <a:rPr lang="de-DE" smtClean="0"/>
               <a:pPr/>
-              <a:t>23.06.2025</a:t>
+              <a:t>24.06.25</a:t>
             </a:fld>
             <a:endParaRPr lang="en-US" dirty="0"/>
           </a:p>
@@ -3208,7 +3510,7 @@
             <a:fld id="{B6F15528-21DE-4FAA-801E-634DDDAF4B2B}" type="slidenum">
               <a:rPr lang="de-DE" smtClean="0"/>
               <a:pPr/>
-              <a:t>12</a:t>
+              <a:t>13</a:t>
             </a:fld>
             <a:endParaRPr lang="de-DE" dirty="0"/>
           </a:p>
@@ -3252,7 +3554,7 @@
 </p:sld>
 </file>
 
-<file path=ppt/slides/slide13.xml><?xml version="1.0" encoding="utf-8"?>
+<file path=ppt/slides/slide14.xml><?xml version="1.0" encoding="utf-8"?>
 <p:sld xmlns:a="http://schemas.openxmlformats.org/drawingml/2006/main" xmlns:r="http://schemas.openxmlformats.org/officeDocument/2006/relationships" xmlns:p="http://schemas.openxmlformats.org/presentationml/2006/main">
   <p:cSld>
     <p:spTree>
@@ -3375,7 +3677,7 @@
                 <a:cs typeface="Times New Roman" panose="02020603050405020304" pitchFamily="18" charset="0"/>
               </a:rPr>
               <a:pPr/>
-              <a:t>23.06.2025</a:t>
+              <a:t>24.06.25</a:t>
             </a:fld>
             <a:endParaRPr lang="en-US" dirty="0">
               <a:latin typeface="Times New Roman" panose="02020603050405020304" pitchFamily="18" charset="0"/>
@@ -3411,7 +3713,7 @@
                 <a:cs typeface="Times New Roman" panose="02020603050405020304" pitchFamily="18" charset="0"/>
               </a:rPr>
               <a:pPr/>
-              <a:t>13</a:t>
+              <a:t>14</a:t>
             </a:fld>
             <a:endParaRPr lang="de-DE" dirty="0">
               <a:latin typeface="Times New Roman" panose="02020603050405020304" pitchFamily="18" charset="0"/>
@@ -4503,7 +4805,7 @@
             <a:fld id="{ACF5EF15-2C16-6A49-87B6-C5AFB945A04B}" type="datetime1">
               <a:rPr lang="de-DE" smtClean="0"/>
               <a:pPr/>
-              <a:t>23.06.2025</a:t>
+              <a:t>24.06.25</a:t>
             </a:fld>
             <a:endParaRPr lang="en-US" dirty="0"/>
           </a:p>
@@ -4846,7 +5148,7 @@
             <a:fld id="{ACF5EF15-2C16-6A49-87B6-C5AFB945A04B}" type="datetime1">
               <a:rPr lang="de-DE" smtClean="0"/>
               <a:pPr/>
-              <a:t>23.06.2025</a:t>
+              <a:t>24.06.25</a:t>
             </a:fld>
             <a:endParaRPr lang="en-US" dirty="0"/>
           </a:p>
@@ -5134,7 +5436,7 @@
             <a:fld id="{ACF5EF15-2C16-6A49-87B6-C5AFB945A04B}" type="datetime1">
               <a:rPr lang="de-DE" smtClean="0"/>
               <a:pPr/>
-              <a:t>23.06.2025</a:t>
+              <a:t>24.06.25</a:t>
             </a:fld>
             <a:endParaRPr lang="en-US" dirty="0"/>
           </a:p>
@@ -5246,6 +5548,348 @@
         <p:cNvPr id="1" name="">
           <a:extLst>
             <a:ext uri="{FF2B5EF4-FFF2-40B4-BE49-F238E27FC236}">
+              <a16:creationId xmlns:a16="http://schemas.microsoft.com/office/drawing/2014/main" id="{663EE811-FA88-EDAD-E282-B09C3F35FF1D}"/>
+            </a:ext>
+          </a:extLst>
+        </p:cNvPr>
+        <p:cNvGrpSpPr/>
+        <p:nvPr/>
+      </p:nvGrpSpPr>
+      <p:grpSpPr>
+        <a:xfrm>
+          <a:off x="0" y="0"/>
+          <a:ext cx="0" cy="0"/>
+          <a:chOff x="0" y="0"/>
+          <a:chExt cx="0" cy="0"/>
+        </a:xfrm>
+      </p:grpSpPr>
+      <p:sp>
+        <p:nvSpPr>
+          <p:cNvPr id="2" name="Title 1">
+            <a:extLst>
+              <a:ext uri="{FF2B5EF4-FFF2-40B4-BE49-F238E27FC236}">
+                <a16:creationId xmlns:a16="http://schemas.microsoft.com/office/drawing/2014/main" id="{AD982735-48A6-DDBA-88F0-39570377F2A7}"/>
+              </a:ext>
+            </a:extLst>
+          </p:cNvPr>
+          <p:cNvSpPr>
+            <a:spLocks noGrp="1"/>
+          </p:cNvSpPr>
+          <p:nvPr>
+            <p:ph type="title"/>
+          </p:nvPr>
+        </p:nvSpPr>
+        <p:spPr/>
+        <p:txBody>
+          <a:bodyPr/>
+          <a:lstStyle/>
+          <a:p>
+            <a:r>
+              <a:rPr lang="en-US" b="1" dirty="0">
+                <a:latin typeface="Times New Roman" panose="02020603050405020304" pitchFamily="18" charset="0"/>
+                <a:cs typeface="Times New Roman" panose="02020603050405020304" pitchFamily="18" charset="0"/>
+              </a:rPr>
+              <a:t>Data Cleaning </a:t>
+            </a:r>
+            <a:r>
+              <a:rPr lang="en-US">
+                <a:latin typeface="Times New Roman" panose="02020603050405020304" pitchFamily="18" charset="0"/>
+                <a:cs typeface="Times New Roman" panose="02020603050405020304" pitchFamily="18" charset="0"/>
+              </a:rPr>
+              <a:t>– Enhanced Dataset</a:t>
+            </a:r>
+            <a:endParaRPr lang="en-US" dirty="0">
+              <a:latin typeface="Times New Roman" panose="02020603050405020304" pitchFamily="18" charset="0"/>
+              <a:cs typeface="Times New Roman" panose="02020603050405020304" pitchFamily="18" charset="0"/>
+            </a:endParaRPr>
+          </a:p>
+        </p:txBody>
+      </p:sp>
+      <p:sp>
+        <p:nvSpPr>
+          <p:cNvPr id="3" name="Text Placeholder 2">
+            <a:extLst>
+              <a:ext uri="{FF2B5EF4-FFF2-40B4-BE49-F238E27FC236}">
+                <a16:creationId xmlns:a16="http://schemas.microsoft.com/office/drawing/2014/main" id="{53731BCC-AA2D-B553-6325-B03E095C2BF3}"/>
+              </a:ext>
+            </a:extLst>
+          </p:cNvPr>
+          <p:cNvSpPr>
+            <a:spLocks noGrp="1"/>
+          </p:cNvSpPr>
+          <p:nvPr>
+            <p:ph type="body" idx="1"/>
+          </p:nvPr>
+        </p:nvSpPr>
+        <p:spPr>
+          <a:xfrm>
+            <a:off x="660800" y="1851670"/>
+            <a:ext cx="8143875" cy="2808312"/>
+          </a:xfrm>
+        </p:spPr>
+        <p:txBody>
+          <a:bodyPr/>
+          <a:lstStyle/>
+          <a:p>
+            <a:pPr marL="342900" indent="-342900">
+              <a:buFont typeface="Wingdings" pitchFamily="2" charset="2"/>
+              <a:buChar char="Ø"/>
+            </a:pPr>
+            <a:r>
+              <a:rPr lang="en-US" dirty="0">
+                <a:latin typeface="Times New Roman" panose="02020603050405020304" pitchFamily="18" charset="0"/>
+                <a:cs typeface="Times New Roman" panose="02020603050405020304" pitchFamily="18" charset="0"/>
+              </a:rPr>
+              <a:t>This is the data after running our data cleaning on it.</a:t>
+            </a:r>
+          </a:p>
+        </p:txBody>
+      </p:sp>
+      <p:sp>
+        <p:nvSpPr>
+          <p:cNvPr id="4" name="Footer Placeholder 3">
+            <a:extLst>
+              <a:ext uri="{FF2B5EF4-FFF2-40B4-BE49-F238E27FC236}">
+                <a16:creationId xmlns:a16="http://schemas.microsoft.com/office/drawing/2014/main" id="{9661E0BE-55D3-3C87-796F-3A6BCC678E0C}"/>
+              </a:ext>
+            </a:extLst>
+          </p:cNvPr>
+          <p:cNvSpPr>
+            <a:spLocks noGrp="1"/>
+          </p:cNvSpPr>
+          <p:nvPr>
+            <p:ph type="ftr" sz="quarter" idx="3"/>
+          </p:nvPr>
+        </p:nvSpPr>
+        <p:spPr/>
+        <p:txBody>
+          <a:bodyPr/>
+          <a:lstStyle/>
+          <a:p>
+            <a:r>
+              <a:rPr lang="de-DE"/>
+              <a:t>Georg-August-Universität Göttingen</a:t>
+            </a:r>
+            <a:endParaRPr lang="de-DE" dirty="0"/>
+          </a:p>
+        </p:txBody>
+      </p:sp>
+      <p:sp>
+        <p:nvSpPr>
+          <p:cNvPr id="5" name="Date Placeholder 4">
+            <a:extLst>
+              <a:ext uri="{FF2B5EF4-FFF2-40B4-BE49-F238E27FC236}">
+                <a16:creationId xmlns:a16="http://schemas.microsoft.com/office/drawing/2014/main" id="{A85033BA-4219-2623-41D0-149AF96A0FE4}"/>
+              </a:ext>
+            </a:extLst>
+          </p:cNvPr>
+          <p:cNvSpPr>
+            <a:spLocks noGrp="1"/>
+          </p:cNvSpPr>
+          <p:nvPr>
+            <p:ph type="dt" sz="half" idx="2"/>
+          </p:nvPr>
+        </p:nvSpPr>
+        <p:spPr/>
+        <p:txBody>
+          <a:bodyPr/>
+          <a:lstStyle/>
+          <a:p>
+            <a:fld id="{ACF5EF15-2C16-6A49-87B6-C5AFB945A04B}" type="datetime1">
+              <a:rPr lang="de-DE" smtClean="0"/>
+              <a:pPr/>
+              <a:t>24.06.25</a:t>
+            </a:fld>
+            <a:endParaRPr lang="en-US" dirty="0"/>
+          </a:p>
+        </p:txBody>
+      </p:sp>
+      <p:sp>
+        <p:nvSpPr>
+          <p:cNvPr id="6" name="Slide Number Placeholder 5">
+            <a:extLst>
+              <a:ext uri="{FF2B5EF4-FFF2-40B4-BE49-F238E27FC236}">
+                <a16:creationId xmlns:a16="http://schemas.microsoft.com/office/drawing/2014/main" id="{8952554D-62F0-F185-B5DC-7D15F98564BD}"/>
+              </a:ext>
+            </a:extLst>
+          </p:cNvPr>
+          <p:cNvSpPr>
+            <a:spLocks noGrp="1"/>
+          </p:cNvSpPr>
+          <p:nvPr>
+            <p:ph type="sldNum" sz="quarter" idx="4"/>
+          </p:nvPr>
+        </p:nvSpPr>
+        <p:spPr/>
+        <p:txBody>
+          <a:bodyPr/>
+          <a:lstStyle/>
+          <a:p>
+            <a:fld id="{B6F15528-21DE-4FAA-801E-634DDDAF4B2B}" type="slidenum">
+              <a:rPr lang="de-DE" smtClean="0"/>
+              <a:pPr/>
+              <a:t>5</a:t>
+            </a:fld>
+            <a:endParaRPr lang="de-DE" dirty="0"/>
+          </a:p>
+        </p:txBody>
+      </p:sp>
+      <p:sp>
+        <p:nvSpPr>
+          <p:cNvPr id="7" name="Text Placeholder 6">
+            <a:extLst>
+              <a:ext uri="{FF2B5EF4-FFF2-40B4-BE49-F238E27FC236}">
+                <a16:creationId xmlns:a16="http://schemas.microsoft.com/office/drawing/2014/main" id="{46B7B68E-66B8-F900-89A8-6FB28F905F87}"/>
+              </a:ext>
+            </a:extLst>
+          </p:cNvPr>
+          <p:cNvSpPr>
+            <a:spLocks noGrp="1"/>
+          </p:cNvSpPr>
+          <p:nvPr>
+            <p:ph type="body" sz="quarter" idx="12"/>
+          </p:nvPr>
+        </p:nvSpPr>
+        <p:spPr/>
+        <p:txBody>
+          <a:bodyPr/>
+          <a:lstStyle/>
+          <a:p>
+            <a:endParaRPr lang="en-US"/>
+          </a:p>
+        </p:txBody>
+      </p:sp>
+      <p:pic>
+        <p:nvPicPr>
+          <p:cNvPr id="10" name="Picture 9">
+            <a:extLst>
+              <a:ext uri="{FF2B5EF4-FFF2-40B4-BE49-F238E27FC236}">
+                <a16:creationId xmlns:a16="http://schemas.microsoft.com/office/drawing/2014/main" id="{7FDEBF0F-CFB1-E49D-CFE8-03212BE92236}"/>
+              </a:ext>
+            </a:extLst>
+          </p:cNvPr>
+          <p:cNvPicPr>
+            <a:picLocks noChangeAspect="1"/>
+          </p:cNvPicPr>
+          <p:nvPr/>
+        </p:nvPicPr>
+        <p:blipFill>
+          <a:blip r:embed="rId2"/>
+          <a:stretch>
+            <a:fillRect/>
+          </a:stretch>
+        </p:blipFill>
+        <p:spPr>
+          <a:xfrm>
+            <a:off x="580284" y="2295658"/>
+            <a:ext cx="7983431" cy="663569"/>
+          </a:xfrm>
+          <a:prstGeom prst="rect">
+            <a:avLst/>
+          </a:prstGeom>
+        </p:spPr>
+      </p:pic>
+      <p:cxnSp>
+        <p:nvCxnSpPr>
+          <p:cNvPr id="9" name="Straight Arrow Connector 8">
+            <a:extLst>
+              <a:ext uri="{FF2B5EF4-FFF2-40B4-BE49-F238E27FC236}">
+                <a16:creationId xmlns:a16="http://schemas.microsoft.com/office/drawing/2014/main" id="{E11DC571-F526-8A7A-0378-1241ADC0DD3D}"/>
+              </a:ext>
+            </a:extLst>
+          </p:cNvPr>
+          <p:cNvCxnSpPr/>
+          <p:nvPr/>
+        </p:nvCxnSpPr>
+        <p:spPr>
+          <a:xfrm flipH="1">
+            <a:off x="4572000" y="2959227"/>
+            <a:ext cx="1080120" cy="548627"/>
+          </a:xfrm>
+          <a:prstGeom prst="straightConnector1">
+            <a:avLst/>
+          </a:prstGeom>
+          <a:ln>
+            <a:solidFill>
+              <a:srgbClr val="FF0000"/>
+            </a:solidFill>
+            <a:tailEnd type="triangle"/>
+          </a:ln>
+        </p:spPr>
+        <p:style>
+          <a:lnRef idx="1">
+            <a:schemeClr val="accent1"/>
+          </a:lnRef>
+          <a:fillRef idx="0">
+            <a:schemeClr val="accent1"/>
+          </a:fillRef>
+          <a:effectRef idx="0">
+            <a:schemeClr val="accent1"/>
+          </a:effectRef>
+          <a:fontRef idx="minor">
+            <a:schemeClr val="tx1"/>
+          </a:fontRef>
+        </p:style>
+      </p:cxnSp>
+      <p:sp>
+        <p:nvSpPr>
+          <p:cNvPr id="11" name="TextBox 10">
+            <a:extLst>
+              <a:ext uri="{FF2B5EF4-FFF2-40B4-BE49-F238E27FC236}">
+                <a16:creationId xmlns:a16="http://schemas.microsoft.com/office/drawing/2014/main" id="{B98063EA-E898-1A8E-89BF-AF74B54BDB8F}"/>
+              </a:ext>
+            </a:extLst>
+          </p:cNvPr>
+          <p:cNvSpPr txBox="1"/>
+          <p:nvPr/>
+        </p:nvSpPr>
+        <p:spPr>
+          <a:xfrm>
+            <a:off x="3184771" y="3515780"/>
+            <a:ext cx="4586512" cy="261610"/>
+          </a:xfrm>
+          <a:prstGeom prst="rect">
+            <a:avLst/>
+          </a:prstGeom>
+          <a:noFill/>
+        </p:spPr>
+        <p:txBody>
+          <a:bodyPr wrap="none" rtlCol="0">
+            <a:spAutoFit/>
+          </a:bodyPr>
+          <a:lstStyle/>
+          <a:p>
+            <a:r>
+              <a:rPr lang="en-US" i="1" dirty="0">
+                <a:latin typeface="Times New Roman" panose="02020603050405020304" pitchFamily="18" charset="0"/>
+                <a:cs typeface="Times New Roman" panose="02020603050405020304" pitchFamily="18" charset="0"/>
+              </a:rPr>
+              <a:t>Extract number information like “rooms”, “bathrooms” etc. from this column</a:t>
+            </a:r>
+          </a:p>
+        </p:txBody>
+      </p:sp>
+    </p:spTree>
+    <p:extLst>
+      <p:ext uri="{BB962C8B-B14F-4D97-AF65-F5344CB8AC3E}">
+        <p14:creationId xmlns:p14="http://schemas.microsoft.com/office/powerpoint/2010/main" val="2665032928"/>
+      </p:ext>
+    </p:extLst>
+  </p:cSld>
+  <p:clrMapOvr>
+    <a:masterClrMapping/>
+  </p:clrMapOvr>
+</p:sld>
+</file>
+
+<file path=ppt/slides/slide6.xml><?xml version="1.0" encoding="utf-8"?>
+<p:sld xmlns:a="http://schemas.openxmlformats.org/drawingml/2006/main" xmlns:r="http://schemas.openxmlformats.org/officeDocument/2006/relationships" xmlns:p="http://schemas.openxmlformats.org/presentationml/2006/main">
+  <p:cSld>
+    <p:spTree>
+      <p:nvGrpSpPr>
+        <p:cNvPr id="1" name="">
+          <a:extLst>
+            <a:ext uri="{FF2B5EF4-FFF2-40B4-BE49-F238E27FC236}">
               <a16:creationId xmlns:a16="http://schemas.microsoft.com/office/drawing/2014/main" id="{EDAE4920-01F5-45C1-437D-32954B90B1AF}"/>
             </a:ext>
           </a:extLst>
@@ -5352,7 +5996,7 @@
             <a:fld id="{ACF5EF15-2C16-6A49-87B6-C5AFB945A04B}" type="datetime1">
               <a:rPr lang="de-DE" smtClean="0"/>
               <a:pPr/>
-              <a:t>23.06.2025</a:t>
+              <a:t>24.06.25</a:t>
             </a:fld>
             <a:endParaRPr lang="en-US" dirty="0"/>
           </a:p>
@@ -5382,7 +6026,7 @@
             <a:fld id="{B6F15528-21DE-4FAA-801E-634DDDAF4B2B}" type="slidenum">
               <a:rPr lang="de-DE" smtClean="0"/>
               <a:pPr/>
-              <a:t>5</a:t>
+              <a:t>6</a:t>
             </a:fld>
             <a:endParaRPr lang="de-DE" dirty="0"/>
           </a:p>
@@ -5629,7 +6273,7 @@
 </p:sld>
 </file>
 
-<file path=ppt/slides/slide6.xml><?xml version="1.0" encoding="utf-8"?>
+<file path=ppt/slides/slide7.xml><?xml version="1.0" encoding="utf-8"?>
 <p:sld xmlns:a="http://schemas.openxmlformats.org/drawingml/2006/main" xmlns:r="http://schemas.openxmlformats.org/officeDocument/2006/relationships" xmlns:p="http://schemas.openxmlformats.org/presentationml/2006/main">
   <p:cSld>
     <p:spTree>
@@ -5743,7 +6387,7 @@
             <a:fld id="{ACF5EF15-2C16-6A49-87B6-C5AFB945A04B}" type="datetime1">
               <a:rPr lang="de-DE" smtClean="0"/>
               <a:pPr/>
-              <a:t>23.06.2025</a:t>
+              <a:t>24.06.25</a:t>
             </a:fld>
             <a:endParaRPr lang="en-US" dirty="0"/>
           </a:p>
@@ -5773,7 +6417,7 @@
             <a:fld id="{B6F15528-21DE-4FAA-801E-634DDDAF4B2B}" type="slidenum">
               <a:rPr lang="de-DE" smtClean="0"/>
               <a:pPr/>
-              <a:t>6</a:t>
+              <a:t>7</a:t>
             </a:fld>
             <a:endParaRPr lang="de-DE" dirty="0"/>
           </a:p>
@@ -6238,7 +6882,7 @@
 </p:sld>
 </file>
 
-<file path=ppt/slides/slide7.xml><?xml version="1.0" encoding="utf-8"?>
+<file path=ppt/slides/slide8.xml><?xml version="1.0" encoding="utf-8"?>
 <p:sld xmlns:a="http://schemas.openxmlformats.org/drawingml/2006/main" xmlns:r="http://schemas.openxmlformats.org/officeDocument/2006/relationships" xmlns:p="http://schemas.openxmlformats.org/presentationml/2006/main">
   <p:cSld>
     <p:spTree>
@@ -6352,7 +6996,7 @@
             <a:fld id="{ACF5EF15-2C16-6A49-87B6-C5AFB945A04B}" type="datetime1">
               <a:rPr lang="de-DE" smtClean="0"/>
               <a:pPr/>
-              <a:t>23.06.2025</a:t>
+              <a:t>24.06.25</a:t>
             </a:fld>
             <a:endParaRPr lang="en-US" dirty="0"/>
           </a:p>
@@ -6382,7 +7026,7 @@
             <a:fld id="{B6F15528-21DE-4FAA-801E-634DDDAF4B2B}" type="slidenum">
               <a:rPr lang="de-DE" smtClean="0"/>
               <a:pPr/>
-              <a:t>7</a:t>
+              <a:t>8</a:t>
             </a:fld>
             <a:endParaRPr lang="de-DE" dirty="0"/>
           </a:p>
@@ -6786,7 +7430,7 @@
 </p:sld>
 </file>
 
-<file path=ppt/slides/slide8.xml><?xml version="1.0" encoding="utf-8"?>
+<file path=ppt/slides/slide9.xml><?xml version="1.0" encoding="utf-8"?>
 <p:sld xmlns:a="http://schemas.openxmlformats.org/drawingml/2006/main" xmlns:r="http://schemas.openxmlformats.org/officeDocument/2006/relationships" xmlns:p="http://schemas.openxmlformats.org/presentationml/2006/main">
   <p:cSld>
     <p:spTree>
@@ -7007,7 +7651,7 @@
             <a:fld id="{ACF5EF15-2C16-6A49-87B6-C5AFB945A04B}" type="datetime1">
               <a:rPr lang="de-DE" smtClean="0"/>
               <a:pPr/>
-              <a:t>23.06.2025</a:t>
+              <a:t>24.06.25</a:t>
             </a:fld>
             <a:endParaRPr lang="en-US" dirty="0"/>
           </a:p>
@@ -7019,260 +7663,6 @@
             <a:extLst>
               <a:ext uri="{FF2B5EF4-FFF2-40B4-BE49-F238E27FC236}">
                 <a16:creationId xmlns:a16="http://schemas.microsoft.com/office/drawing/2014/main" id="{244DBDB4-F8FC-39A8-A156-A15C1B79C81D}"/>
-              </a:ext>
-            </a:extLst>
-          </p:cNvPr>
-          <p:cNvSpPr>
-            <a:spLocks noGrp="1"/>
-          </p:cNvSpPr>
-          <p:nvPr>
-            <p:ph type="sldNum" sz="quarter" idx="4"/>
-          </p:nvPr>
-        </p:nvSpPr>
-        <p:spPr/>
-        <p:txBody>
-          <a:bodyPr/>
-          <a:lstStyle/>
-          <a:p>
-            <a:fld id="{B6F15528-21DE-4FAA-801E-634DDDAF4B2B}" type="slidenum">
-              <a:rPr lang="de-DE" smtClean="0"/>
-              <a:pPr/>
-              <a:t>8</a:t>
-            </a:fld>
-            <a:endParaRPr lang="de-DE" dirty="0"/>
-          </a:p>
-        </p:txBody>
-      </p:sp>
-      <p:sp>
-        <p:nvSpPr>
-          <p:cNvPr id="7" name="Text Placeholder 6">
-            <a:extLst>
-              <a:ext uri="{FF2B5EF4-FFF2-40B4-BE49-F238E27FC236}">
-                <a16:creationId xmlns:a16="http://schemas.microsoft.com/office/drawing/2014/main" id="{14427F3E-7D6A-2E12-E5A2-F2EA77DFD9C9}"/>
-              </a:ext>
-            </a:extLst>
-          </p:cNvPr>
-          <p:cNvSpPr>
-            <a:spLocks noGrp="1"/>
-          </p:cNvSpPr>
-          <p:nvPr>
-            <p:ph type="body" sz="quarter" idx="12"/>
-          </p:nvPr>
-        </p:nvSpPr>
-        <p:spPr/>
-        <p:txBody>
-          <a:bodyPr/>
-          <a:lstStyle/>
-          <a:p>
-            <a:endParaRPr lang="en-US"/>
-          </a:p>
-        </p:txBody>
-      </p:sp>
-    </p:spTree>
-    <p:extLst>
-      <p:ext uri="{BB962C8B-B14F-4D97-AF65-F5344CB8AC3E}">
-        <p14:creationId xmlns:p14="http://schemas.microsoft.com/office/powerpoint/2010/main" val="1244078694"/>
-      </p:ext>
-    </p:extLst>
-  </p:cSld>
-  <p:clrMapOvr>
-    <a:masterClrMapping/>
-  </p:clrMapOvr>
-</p:sld>
-</file>
-
-<file path=ppt/slides/slide9.xml><?xml version="1.0" encoding="utf-8"?>
-<p:sld xmlns:a="http://schemas.openxmlformats.org/drawingml/2006/main" xmlns:r="http://schemas.openxmlformats.org/officeDocument/2006/relationships" xmlns:p="http://schemas.openxmlformats.org/presentationml/2006/main">
-  <p:cSld>
-    <p:spTree>
-      <p:nvGrpSpPr>
-        <p:cNvPr id="1" name="">
-          <a:extLst>
-            <a:ext uri="{FF2B5EF4-FFF2-40B4-BE49-F238E27FC236}">
-              <a16:creationId xmlns:a16="http://schemas.microsoft.com/office/drawing/2014/main" id="{4AA49870-27B0-7685-862B-3AEB5695355D}"/>
-            </a:ext>
-          </a:extLst>
-        </p:cNvPr>
-        <p:cNvGrpSpPr/>
-        <p:nvPr/>
-      </p:nvGrpSpPr>
-      <p:grpSpPr>
-        <a:xfrm>
-          <a:off x="0" y="0"/>
-          <a:ext cx="0" cy="0"/>
-          <a:chOff x="0" y="0"/>
-          <a:chExt cx="0" cy="0"/>
-        </a:xfrm>
-      </p:grpSpPr>
-      <p:sp>
-        <p:nvSpPr>
-          <p:cNvPr id="2" name="Title 1">
-            <a:extLst>
-              <a:ext uri="{FF2B5EF4-FFF2-40B4-BE49-F238E27FC236}">
-                <a16:creationId xmlns:a16="http://schemas.microsoft.com/office/drawing/2014/main" id="{66449D65-759A-962E-F4F3-DDF87E12A0DE}"/>
-              </a:ext>
-            </a:extLst>
-          </p:cNvPr>
-          <p:cNvSpPr>
-            <a:spLocks noGrp="1"/>
-          </p:cNvSpPr>
-          <p:nvPr>
-            <p:ph type="title"/>
-          </p:nvPr>
-        </p:nvSpPr>
-        <p:spPr/>
-        <p:txBody>
-          <a:bodyPr/>
-          <a:lstStyle/>
-          <a:p>
-            <a:r>
-              <a:rPr lang="en-US" b="1" dirty="0">
-                <a:latin typeface="Times New Roman" panose="02020603050405020304" pitchFamily="18" charset="0"/>
-                <a:cs typeface="Times New Roman" panose="02020603050405020304" pitchFamily="18" charset="0"/>
-              </a:rPr>
-              <a:t>Different Models </a:t>
-            </a:r>
-            <a:r>
-              <a:rPr lang="en-US" dirty="0">
-                <a:latin typeface="Times New Roman" panose="02020603050405020304" pitchFamily="18" charset="0"/>
-                <a:cs typeface="Times New Roman" panose="02020603050405020304" pitchFamily="18" charset="0"/>
-              </a:rPr>
-              <a:t>–</a:t>
-            </a:r>
-            <a:r>
-              <a:rPr lang="en-US" sz="2400" dirty="0">
-                <a:latin typeface="Times New Roman" panose="02020603050405020304" pitchFamily="18" charset="0"/>
-                <a:cs typeface="Times New Roman" panose="02020603050405020304" pitchFamily="18" charset="0"/>
-              </a:rPr>
-              <a:t> Linear or Polynomial Regression</a:t>
-            </a:r>
-            <a:endParaRPr lang="en-US" dirty="0">
-              <a:latin typeface="Times New Roman" panose="02020603050405020304" pitchFamily="18" charset="0"/>
-              <a:cs typeface="Times New Roman" panose="02020603050405020304" pitchFamily="18" charset="0"/>
-            </a:endParaRPr>
-          </a:p>
-        </p:txBody>
-      </p:sp>
-      <p:sp>
-        <p:nvSpPr>
-          <p:cNvPr id="3" name="Text Placeholder 2">
-            <a:extLst>
-              <a:ext uri="{FF2B5EF4-FFF2-40B4-BE49-F238E27FC236}">
-                <a16:creationId xmlns:a16="http://schemas.microsoft.com/office/drawing/2014/main" id="{5FE36AFA-D0E4-5A70-1353-C70E56DFD640}"/>
-              </a:ext>
-            </a:extLst>
-          </p:cNvPr>
-          <p:cNvSpPr>
-            <a:spLocks noGrp="1"/>
-          </p:cNvSpPr>
-          <p:nvPr>
-            <p:ph type="body" idx="1"/>
-          </p:nvPr>
-        </p:nvSpPr>
-        <p:spPr>
-          <a:xfrm>
-            <a:off x="660800" y="1563638"/>
-            <a:ext cx="3335137" cy="2808312"/>
-          </a:xfrm>
-        </p:spPr>
-        <p:txBody>
-          <a:bodyPr/>
-          <a:lstStyle/>
-          <a:p>
-            <a:pPr marL="342900" indent="-342900">
-              <a:buFont typeface="Wingdings" pitchFamily="2" charset="2"/>
-              <a:buChar char="Ø"/>
-            </a:pPr>
-            <a:r>
-              <a:rPr lang="en-US" i="1" dirty="0">
-                <a:latin typeface="Times New Roman" panose="02020603050405020304" pitchFamily="18" charset="0"/>
-                <a:cs typeface="Times New Roman" panose="02020603050405020304" pitchFamily="18" charset="0"/>
-              </a:rPr>
-              <a:t>Using scikit-learn </a:t>
-            </a:r>
-            <a:r>
-              <a:rPr lang="en-US" i="1" dirty="0">
-                <a:latin typeface="Times New Roman" panose="02020603050405020304" pitchFamily="18" charset="0"/>
-                <a:cs typeface="Times New Roman" panose="02020603050405020304" pitchFamily="18" charset="0"/>
-                <a:hlinkClick r:id="rId2"/>
-              </a:rPr>
-              <a:t>https://scikit-learn.org/stable/modules/generated/sklearn.linear_model.LinearRegression.html</a:t>
-            </a:r>
-            <a:r>
-              <a:rPr lang="en-US" i="1" dirty="0">
-                <a:latin typeface="Times New Roman" panose="02020603050405020304" pitchFamily="18" charset="0"/>
-                <a:cs typeface="Times New Roman" panose="02020603050405020304" pitchFamily="18" charset="0"/>
-              </a:rPr>
-              <a:t> </a:t>
-            </a:r>
-          </a:p>
-        </p:txBody>
-      </p:sp>
-      <p:sp>
-        <p:nvSpPr>
-          <p:cNvPr id="4" name="Footer Placeholder 3">
-            <a:extLst>
-              <a:ext uri="{FF2B5EF4-FFF2-40B4-BE49-F238E27FC236}">
-                <a16:creationId xmlns:a16="http://schemas.microsoft.com/office/drawing/2014/main" id="{B441B04E-B54D-CA82-FA87-EF5BC37F6787}"/>
-              </a:ext>
-            </a:extLst>
-          </p:cNvPr>
-          <p:cNvSpPr>
-            <a:spLocks noGrp="1"/>
-          </p:cNvSpPr>
-          <p:nvPr>
-            <p:ph type="ftr" sz="quarter" idx="3"/>
-          </p:nvPr>
-        </p:nvSpPr>
-        <p:spPr/>
-        <p:txBody>
-          <a:bodyPr/>
-          <a:lstStyle/>
-          <a:p>
-            <a:r>
-              <a:rPr lang="de-DE"/>
-              <a:t>Georg-August-Universität Göttingen</a:t>
-            </a:r>
-            <a:endParaRPr lang="de-DE" dirty="0"/>
-          </a:p>
-        </p:txBody>
-      </p:sp>
-      <p:sp>
-        <p:nvSpPr>
-          <p:cNvPr id="5" name="Date Placeholder 4">
-            <a:extLst>
-              <a:ext uri="{FF2B5EF4-FFF2-40B4-BE49-F238E27FC236}">
-                <a16:creationId xmlns:a16="http://schemas.microsoft.com/office/drawing/2014/main" id="{C615A5CF-9BD7-1252-BB15-AEEFA9100735}"/>
-              </a:ext>
-            </a:extLst>
-          </p:cNvPr>
-          <p:cNvSpPr>
-            <a:spLocks noGrp="1"/>
-          </p:cNvSpPr>
-          <p:nvPr>
-            <p:ph type="dt" sz="half" idx="2"/>
-          </p:nvPr>
-        </p:nvSpPr>
-        <p:spPr/>
-        <p:txBody>
-          <a:bodyPr/>
-          <a:lstStyle/>
-          <a:p>
-            <a:fld id="{ACF5EF15-2C16-6A49-87B6-C5AFB945A04B}" type="datetime1">
-              <a:rPr lang="de-DE" smtClean="0"/>
-              <a:pPr/>
-              <a:t>23.06.2025</a:t>
-            </a:fld>
-            <a:endParaRPr lang="en-US" dirty="0"/>
-          </a:p>
-        </p:txBody>
-      </p:sp>
-      <p:sp>
-        <p:nvSpPr>
-          <p:cNvPr id="6" name="Slide Number Placeholder 5">
-            <a:extLst>
-              <a:ext uri="{FF2B5EF4-FFF2-40B4-BE49-F238E27FC236}">
-                <a16:creationId xmlns:a16="http://schemas.microsoft.com/office/drawing/2014/main" id="{87A3A427-7A1A-6DC6-5F8B-989045EA002D}"/>
               </a:ext>
             </a:extLst>
           </p:cNvPr>
@@ -7302,7 +7692,7 @@
           <p:cNvPr id="7" name="Text Placeholder 6">
             <a:extLst>
               <a:ext uri="{FF2B5EF4-FFF2-40B4-BE49-F238E27FC236}">
-                <a16:creationId xmlns:a16="http://schemas.microsoft.com/office/drawing/2014/main" id="{52581F9D-4FEA-92EB-40CF-9EDB007EF78D}"/>
+                <a16:creationId xmlns:a16="http://schemas.microsoft.com/office/drawing/2014/main" id="{14427F3E-7D6A-2E12-E5A2-F2EA77DFD9C9}"/>
               </a:ext>
             </a:extLst>
           </p:cNvPr>
@@ -7322,57 +7712,10 @@
           </a:p>
         </p:txBody>
       </p:sp>
-      <p:pic>
-        <p:nvPicPr>
-          <p:cNvPr id="1026" name="Picture 2">
-            <a:extLst>
-              <a:ext uri="{FF2B5EF4-FFF2-40B4-BE49-F238E27FC236}">
-                <a16:creationId xmlns:a16="http://schemas.microsoft.com/office/drawing/2014/main" id="{205B5544-B289-DAEC-091E-C44BD4D543F4}"/>
-              </a:ext>
-            </a:extLst>
-          </p:cNvPr>
-          <p:cNvPicPr>
-            <a:picLocks noChangeAspect="1" noChangeArrowheads="1"/>
-          </p:cNvPicPr>
-          <p:nvPr/>
-        </p:nvPicPr>
-        <p:blipFill rotWithShape="1">
-          <a:blip r:embed="rId3">
-            <a:extLst>
-              <a:ext uri="{28A0092B-C50C-407E-A947-70E740481C1C}">
-                <a14:useLocalDpi xmlns:a14="http://schemas.microsoft.com/office/drawing/2010/main" val="0"/>
-              </a:ext>
-            </a:extLst>
-          </a:blip>
-          <a:srcRect l="22484" t="29027" r="22376" b="31736"/>
-          <a:stretch>
-            <a:fillRect/>
-          </a:stretch>
-        </p:blipFill>
-        <p:spPr bwMode="auto">
-          <a:xfrm>
-            <a:off x="4700156" y="1491630"/>
-            <a:ext cx="2529755" cy="1800200"/>
-          </a:xfrm>
-          <a:prstGeom prst="rect">
-            <a:avLst/>
-          </a:prstGeom>
-          <a:noFill/>
-          <a:extLst>
-            <a:ext uri="{909E8E84-426E-40DD-AFC4-6F175D3DCCD1}">
-              <a14:hiddenFill xmlns:a14="http://schemas.microsoft.com/office/drawing/2010/main">
-                <a:solidFill>
-                  <a:srgbClr val="FFFFFF"/>
-                </a:solidFill>
-              </a14:hiddenFill>
-            </a:ext>
-          </a:extLst>
-        </p:spPr>
-      </p:pic>
     </p:spTree>
     <p:extLst>
       <p:ext uri="{BB962C8B-B14F-4D97-AF65-F5344CB8AC3E}">
-        <p14:creationId xmlns:p14="http://schemas.microsoft.com/office/powerpoint/2010/main" val="4170914606"/>
+        <p14:creationId xmlns:p14="http://schemas.microsoft.com/office/powerpoint/2010/main" val="1244078694"/>
       </p:ext>
     </p:extLst>
   </p:cSld>

</xml_diff>

<commit_message>
LENNART - adds Random forest slide and question slides
</commit_message>
<xml_diff>
--- a/docs/intermediate-pres.pptx
+++ b/docs/intermediate-pres.pptx
@@ -2748,6 +2748,53 @@
           <a:chExt cx="0" cy="0"/>
         </a:xfrm>
       </p:grpSpPr>
+      <p:pic>
+        <p:nvPicPr>
+          <p:cNvPr id="1026" name="Picture 2" descr="undefined">
+            <a:extLst>
+              <a:ext uri="{FF2B5EF4-FFF2-40B4-BE49-F238E27FC236}">
+                <a16:creationId xmlns:a16="http://schemas.microsoft.com/office/drawing/2014/main" id="{FCA95A0A-51E2-E8D8-4E82-18CF709AE5F5}"/>
+              </a:ext>
+            </a:extLst>
+          </p:cNvPr>
+          <p:cNvPicPr>
+            <a:picLocks noChangeAspect="1" noChangeArrowheads="1"/>
+          </p:cNvPicPr>
+          <p:nvPr/>
+        </p:nvPicPr>
+        <p:blipFill>
+          <a:blip r:embed="rId2">
+            <a:extLst>
+              <a:ext uri="{28A0092B-C50C-407E-A947-70E740481C1C}">
+                <a14:useLocalDpi xmlns:a14="http://schemas.microsoft.com/office/drawing/2010/main" val="0"/>
+              </a:ext>
+            </a:extLst>
+          </a:blip>
+          <a:srcRect/>
+          <a:stretch>
+            <a:fillRect/>
+          </a:stretch>
+        </p:blipFill>
+        <p:spPr bwMode="auto">
+          <a:xfrm>
+            <a:off x="4310837" y="1669946"/>
+            <a:ext cx="4614568" cy="2595695"/>
+          </a:xfrm>
+          <a:prstGeom prst="rect">
+            <a:avLst/>
+          </a:prstGeom>
+          <a:noFill/>
+          <a:extLst>
+            <a:ext uri="{909E8E84-426E-40DD-AFC4-6F175D3DCCD1}">
+              <a14:hiddenFill xmlns:a14="http://schemas.microsoft.com/office/drawing/2010/main">
+                <a:solidFill>
+                  <a:srgbClr val="FFFFFF"/>
+                </a:solidFill>
+              </a14:hiddenFill>
+            </a:ext>
+          </a:extLst>
+        </p:spPr>
+      </p:pic>
       <p:sp>
         <p:nvSpPr>
           <p:cNvPr id="2" name="Title 1">
@@ -2816,7 +2863,7 @@
         <p:spPr>
           <a:xfrm>
             <a:off x="660800" y="1563638"/>
-            <a:ext cx="3335137" cy="2808312"/>
+            <a:ext cx="3335136" cy="2808312"/>
           </a:xfrm>
         </p:spPr>
         <p:txBody>
@@ -2828,12 +2875,50 @@
               <a:buChar char="Ø"/>
             </a:pPr>
             <a:r>
+              <a:rPr lang="en-US" b="1" dirty="0">
+                <a:latin typeface="Times New Roman" panose="02020603050405020304" pitchFamily="18" charset="0"/>
+                <a:cs typeface="Times New Roman" panose="02020603050405020304" pitchFamily="18" charset="0"/>
+              </a:rPr>
+              <a:t>Random Forest &amp; Gradient Boosting</a:t>
+            </a:r>
+          </a:p>
+          <a:p>
+            <a:pPr marL="342900" indent="-342900">
+              <a:buFont typeface="Wingdings" pitchFamily="2" charset="2"/>
+              <a:buChar char="Ø"/>
+            </a:pPr>
+            <a:r>
               <a:rPr lang="en-US" i="1" dirty="0">
                 <a:latin typeface="Times New Roman" panose="02020603050405020304" pitchFamily="18" charset="0"/>
                 <a:cs typeface="Times New Roman" panose="02020603050405020304" pitchFamily="18" charset="0"/>
               </a:rPr>
-              <a:t>TODO</a:t>
-            </a:r>
+              <a:t>https://scikit-</a:t>
+            </a:r>
+            <a:r>
+              <a:rPr lang="en-US" i="1" dirty="0" err="1">
+                <a:latin typeface="Times New Roman" panose="02020603050405020304" pitchFamily="18" charset="0"/>
+                <a:cs typeface="Times New Roman" panose="02020603050405020304" pitchFamily="18" charset="0"/>
+              </a:rPr>
+              <a:t>learn.org</a:t>
+            </a:r>
+            <a:r>
+              <a:rPr lang="en-US" i="1" dirty="0">
+                <a:latin typeface="Times New Roman" panose="02020603050405020304" pitchFamily="18" charset="0"/>
+                <a:cs typeface="Times New Roman" panose="02020603050405020304" pitchFamily="18" charset="0"/>
+              </a:rPr>
+              <a:t>/stable/modules/generated/</a:t>
+            </a:r>
+            <a:r>
+              <a:rPr lang="en-US" i="1" dirty="0" err="1">
+                <a:latin typeface="Times New Roman" panose="02020603050405020304" pitchFamily="18" charset="0"/>
+                <a:cs typeface="Times New Roman" panose="02020603050405020304" pitchFamily="18" charset="0"/>
+              </a:rPr>
+              <a:t>sklearn.ensemble.RandomForestClassifier.html</a:t>
+            </a:r>
+            <a:endParaRPr lang="en-US" i="1" dirty="0">
+              <a:latin typeface="Times New Roman" panose="02020603050405020304" pitchFamily="18" charset="0"/>
+              <a:cs typeface="Times New Roman" panose="02020603050405020304" pitchFamily="18" charset="0"/>
+            </a:endParaRPr>
           </a:p>
         </p:txBody>
       </p:sp>

</xml_diff>